<commit_message>
edits to presentation and .pdf output
</commit_message>
<xml_diff>
--- a/PeterKazarinoff_PyPDX_2019-10-08.pptx
+++ b/PeterKazarinoff_PyPDX_2019-10-08.pptx
@@ -5,7 +5,7 @@
     <p:sldMasterId id="2147483660" r:id="rId1"/>
   </p:sldMasterIdLst>
   <p:notesMasterIdLst>
-    <p:notesMasterId r:id="rId21"/>
+    <p:notesMasterId r:id="rId22"/>
   </p:notesMasterIdLst>
   <p:sldIdLst>
     <p:sldId id="256" r:id="rId2"/>
@@ -21,12 +21,13 @@
     <p:sldId id="274" r:id="rId12"/>
     <p:sldId id="263" r:id="rId13"/>
     <p:sldId id="264" r:id="rId14"/>
-    <p:sldId id="266" r:id="rId15"/>
-    <p:sldId id="265" r:id="rId16"/>
-    <p:sldId id="267" r:id="rId17"/>
-    <p:sldId id="269" r:id="rId18"/>
-    <p:sldId id="270" r:id="rId19"/>
-    <p:sldId id="271" r:id="rId20"/>
+    <p:sldId id="275" r:id="rId15"/>
+    <p:sldId id="266" r:id="rId16"/>
+    <p:sldId id="265" r:id="rId17"/>
+    <p:sldId id="267" r:id="rId18"/>
+    <p:sldId id="269" r:id="rId19"/>
+    <p:sldId id="270" r:id="rId20"/>
+    <p:sldId id="271" r:id="rId21"/>
   </p:sldIdLst>
   <p:sldSz cx="9144000" cy="6858000" type="screen4x3"/>
   <p:notesSz cx="6858000" cy="9144000"/>
@@ -3400,8 +3401,8 @@
         </p:nvSpPr>
         <p:spPr>
           <a:xfrm>
-            <a:off x="531845" y="1057570"/>
-            <a:ext cx="8159621" cy="830997"/>
+            <a:off x="711632" y="848563"/>
+            <a:ext cx="7962106" cy="707886"/>
           </a:xfrm>
           <a:prstGeom prst="rect">
             <a:avLst/>
@@ -3415,21 +3416,14 @@
           <a:lstStyle/>
           <a:p>
             <a:r>
-              <a:rPr lang="en-US" sz="2400" dirty="0" err="1"/>
+              <a:rPr lang="en-US" sz="4000" dirty="0" err="1" smtClean="0"/>
               <a:t>JupyterHub</a:t>
             </a:r>
             <a:r>
-              <a:rPr lang="en-US" sz="2400" dirty="0"/>
-              <a:t>:</a:t>
-            </a:r>
-            <a:r>
-              <a:rPr lang="en-US" sz="2400" dirty="0"/>
-              <a:t> </a:t>
-            </a:r>
-            <a:r>
-              <a:rPr lang="en-US" sz="2400" dirty="0"/>
-              <a:t>A free, online, open-source computing environment</a:t>
-            </a:r>
+              <a:rPr lang="en-US" sz="4000" dirty="0" smtClean="0"/>
+              <a:t> in Engineering Education</a:t>
+            </a:r>
+            <a:endParaRPr lang="en-US" sz="4000" dirty="0"/>
           </a:p>
         </p:txBody>
       </p:sp>
@@ -3441,8 +3435,8 @@
         </p:nvSpPr>
         <p:spPr>
           <a:xfrm>
-            <a:off x="5063087" y="4944067"/>
-            <a:ext cx="4014176" cy="1015663"/>
+            <a:off x="4140926" y="5070187"/>
+            <a:ext cx="4820193" cy="1200329"/>
           </a:xfrm>
           <a:prstGeom prst="rect">
             <a:avLst/>
@@ -3450,51 +3444,51 @@
           <a:noFill/>
         </p:spPr>
         <p:txBody>
-          <a:bodyPr wrap="none" rtlCol="0">
+          <a:bodyPr wrap="square" rtlCol="0">
             <a:spAutoFit/>
           </a:bodyPr>
           <a:lstStyle/>
           <a:p>
             <a:r>
-              <a:rPr lang="en-US" sz="1500" dirty="0"/>
+              <a:rPr lang="en-US" dirty="0"/>
               <a:t>Peter D. </a:t>
             </a:r>
             <a:r>
-              <a:rPr lang="en-US" sz="1500" dirty="0" err="1"/>
+              <a:rPr lang="en-US" dirty="0" err="1"/>
               <a:t>Kazarinoff</a:t>
             </a:r>
-            <a:endParaRPr lang="en-US" sz="1500" dirty="0"/>
-          </a:p>
-          <a:p>
-            <a:r>
-              <a:rPr lang="en-US" sz="1500" dirty="0"/>
+            <a:endParaRPr lang="en-US" dirty="0"/>
+          </a:p>
+          <a:p>
+            <a:r>
+              <a:rPr lang="en-US" dirty="0"/>
               <a:t>Division of Engineering and Industrial Technology</a:t>
             </a:r>
           </a:p>
           <a:p>
             <a:r>
-              <a:rPr lang="en-US" sz="1500" dirty="0"/>
+              <a:rPr lang="en-US" dirty="0"/>
               <a:t>Portland Community College</a:t>
             </a:r>
           </a:p>
           <a:p>
             <a:r>
-              <a:rPr lang="en-US" sz="1500" dirty="0"/>
+              <a:rPr lang="en-US" dirty="0"/>
               <a:t>@</a:t>
             </a:r>
             <a:r>
-              <a:rPr lang="en-US" sz="1500" dirty="0" err="1"/>
+              <a:rPr lang="en-US" dirty="0" err="1"/>
               <a:t>pkazarinoff</a:t>
             </a:r>
             <a:r>
-              <a:rPr lang="en-US" sz="1500" dirty="0"/>
+              <a:rPr lang="en-US" dirty="0"/>
               <a:t>   GitHub: </a:t>
             </a:r>
             <a:r>
-              <a:rPr lang="en-US" sz="1500" dirty="0" err="1"/>
+              <a:rPr lang="en-US" dirty="0" err="1"/>
               <a:t>ProfessorKazarinoff</a:t>
             </a:r>
-            <a:endParaRPr lang="en-US" sz="1500" dirty="0"/>
+            <a:endParaRPr lang="en-US" dirty="0"/>
           </a:p>
         </p:txBody>
       </p:sp>
@@ -3506,7 +3500,7 @@
         </p:nvSpPr>
         <p:spPr>
           <a:xfrm>
-            <a:off x="76978" y="5636563"/>
+            <a:off x="4153989" y="6353229"/>
             <a:ext cx="4883196" cy="323165"/>
           </a:xfrm>
           <a:prstGeom prst="rect">
@@ -4075,7 +4069,6 @@
               <a:rPr lang="en-US" dirty="0" smtClean="0"/>
               <a:t>Need custom packages, custom environment not available publically</a:t>
             </a:r>
-            <a:endParaRPr lang="en-US" dirty="0" smtClean="0"/>
           </a:p>
           <a:p>
             <a:r>
@@ -4339,7 +4332,6 @@
               <a:rPr lang="en-US" sz="3800" dirty="0" smtClean="0"/>
               <a:t>Configuration file</a:t>
             </a:r>
-            <a:endParaRPr lang="en-US" sz="3800" dirty="0" smtClean="0"/>
           </a:p>
           <a:p>
             <a:r>
@@ -4960,29 +4952,19 @@
         </p:nvSpPr>
         <p:spPr>
           <a:xfrm>
-            <a:off x="226950" y="218813"/>
-            <a:ext cx="7886700" cy="1325563"/>
-          </a:xfrm>
-        </p:spPr>
-        <p:txBody>
-          <a:bodyPr/>
+            <a:off x="131795" y="172241"/>
+            <a:ext cx="3545631" cy="864880"/>
+          </a:xfrm>
+        </p:spPr>
+        <p:txBody>
+          <a:bodyPr>
+            <a:normAutofit/>
+          </a:bodyPr>
           <a:lstStyle/>
           <a:p>
             <a:r>
               <a:rPr lang="en-US" dirty="0" smtClean="0"/>
-              <a:t>Classic Notebook </a:t>
-            </a:r>
-            <a:r>
-              <a:rPr lang="en-US" dirty="0" smtClean="0"/>
-              <a:t>or </a:t>
-            </a:r>
-            <a:r>
-              <a:rPr lang="en-US" dirty="0" err="1" smtClean="0"/>
-              <a:t>JupyterLab</a:t>
-            </a:r>
-            <a:r>
-              <a:rPr lang="en-US" dirty="0" smtClean="0"/>
-              <a:t> Interface</a:t>
+              <a:t>Storage</a:t>
             </a:r>
             <a:endParaRPr lang="en-US" dirty="0"/>
           </a:p>
@@ -5011,15 +4993,73 @@
           </a:p>
         </p:txBody>
       </p:sp>
+      <p:sp>
+        <p:nvSpPr>
+          <p:cNvPr id="5" name="Rectangle 4"/>
+          <p:cNvSpPr/>
+          <p:nvPr/>
+        </p:nvSpPr>
+        <p:spPr>
+          <a:xfrm>
+            <a:off x="4179944" y="1996559"/>
+            <a:ext cx="676019" cy="300082"/>
+          </a:xfrm>
+          <a:prstGeom prst="rect">
+            <a:avLst/>
+          </a:prstGeom>
+        </p:spPr>
+        <p:txBody>
+          <a:bodyPr wrap="none">
+            <a:spAutoFit/>
+          </a:bodyPr>
+          <a:lstStyle/>
+          <a:p>
+            <a:r>
+              <a:rPr lang="en-US" sz="1350" dirty="0" smtClean="0"/>
+              <a:t>Docker</a:t>
+            </a:r>
+            <a:endParaRPr lang="en-US" sz="1350" dirty="0"/>
+          </a:p>
+        </p:txBody>
+      </p:sp>
+      <p:sp>
+        <p:nvSpPr>
+          <p:cNvPr id="7" name="Rectangle 6"/>
+          <p:cNvSpPr/>
+          <p:nvPr/>
+        </p:nvSpPr>
+        <p:spPr>
+          <a:xfrm>
+            <a:off x="351040" y="2088970"/>
+            <a:ext cx="1464697" cy="300082"/>
+          </a:xfrm>
+          <a:prstGeom prst="rect">
+            <a:avLst/>
+          </a:prstGeom>
+        </p:spPr>
+        <p:txBody>
+          <a:bodyPr wrap="square">
+            <a:spAutoFit/>
+          </a:bodyPr>
+          <a:lstStyle/>
+          <a:p>
+            <a:r>
+              <a:rPr lang="en-US" sz="1350" dirty="0" smtClean="0"/>
+              <a:t>VM File System</a:t>
+            </a:r>
+            <a:endParaRPr lang="en-US" sz="1350" dirty="0"/>
+          </a:p>
+        </p:txBody>
+      </p:sp>
       <p:pic>
         <p:nvPicPr>
-          <p:cNvPr id="4" name="Picture 3"/>
+          <p:cNvPr id="1026" name="Picture 2" descr="Image result for folder icon"/>
           <p:cNvPicPr>
-            <a:picLocks noChangeAspect="1"/>
+            <a:picLocks noChangeAspect="1" noChangeArrowheads="1"/>
           </p:cNvPicPr>
           <p:nvPr/>
         </p:nvPicPr>
-        <p:blipFill>
+        <p:blipFill rotWithShape="1">
           <a:blip r:embed="rId2" cstate="print">
             <a:extLst>
               <a:ext uri="{28A0092B-C50C-407E-A947-70E740481C1C}">
@@ -5027,30 +5067,62 @@
               </a:ext>
             </a:extLst>
           </a:blip>
-          <a:stretch>
-            <a:fillRect/>
-          </a:stretch>
+          <a:srcRect l="134" t="12473" r="-134" b="11721"/>
+          <a:stretch/>
         </p:blipFill>
-        <p:spPr>
-          <a:xfrm>
-            <a:off x="4910431" y="2528735"/>
-            <a:ext cx="3983874" cy="2560779"/>
+        <p:spPr bwMode="auto">
+          <a:xfrm>
+            <a:off x="351040" y="2532874"/>
+            <a:ext cx="2272903" cy="1722942"/>
           </a:xfrm>
           <a:prstGeom prst="rect">
             <a:avLst/>
           </a:prstGeom>
-          <a:ln>
-            <a:solidFill>
-              <a:schemeClr val="accent1"/>
-            </a:solidFill>
-          </a:ln>
+          <a:noFill/>
+          <a:extLst>
+            <a:ext uri="{909E8E84-426E-40DD-AFC4-6F175D3DCCD1}">
+              <a14:hiddenFill xmlns:a14="http://schemas.microsoft.com/office/drawing/2010/main">
+                <a:solidFill>
+                  <a:srgbClr val="FFFFFF"/>
+                </a:solidFill>
+              </a14:hiddenFill>
+            </a:ext>
+          </a:extLst>
         </p:spPr>
       </p:pic>
+      <p:sp>
+        <p:nvSpPr>
+          <p:cNvPr id="14" name="Rectangle 13"/>
+          <p:cNvSpPr/>
+          <p:nvPr/>
+        </p:nvSpPr>
+        <p:spPr>
+          <a:xfrm>
+            <a:off x="7220170" y="1962515"/>
+            <a:ext cx="988669" cy="300082"/>
+          </a:xfrm>
+          <a:prstGeom prst="rect">
+            <a:avLst/>
+          </a:prstGeom>
+        </p:spPr>
+        <p:txBody>
+          <a:bodyPr wrap="none">
+            <a:spAutoFit/>
+          </a:bodyPr>
+          <a:lstStyle/>
+          <a:p>
+            <a:r>
+              <a:rPr lang="en-US" sz="1350" dirty="0" smtClean="0"/>
+              <a:t>Kubernetes</a:t>
+            </a:r>
+          </a:p>
+        </p:txBody>
+      </p:sp>
       <p:pic>
         <p:nvPicPr>
-          <p:cNvPr id="5" name="Picture 4"/>
+          <p:cNvPr id="1030" name="Picture 6" descr="Image result for docker logo"/>
           <p:cNvPicPr>
-            <a:picLocks noChangeAspect="1"/>
+            <a:picLocks noChangeAspect="1" noChangeArrowheads="1"/>
           </p:cNvPicPr>
           <p:nvPr/>
         </p:nvPicPr>
@@ -5062,95 +5134,76 @@
               </a:ext>
             </a:extLst>
           </a:blip>
+          <a:srcRect/>
           <a:stretch>
             <a:fillRect/>
           </a:stretch>
         </p:blipFill>
-        <p:spPr>
-          <a:xfrm>
-            <a:off x="226950" y="2544536"/>
-            <a:ext cx="4431314" cy="2561219"/>
-          </a:xfrm>
-          <a:prstGeom prst="rect">
-            <a:avLst/>
-          </a:prstGeom>
-          <a:ln>
-            <a:solidFill>
-              <a:schemeClr val="accent1"/>
-            </a:solidFill>
-          </a:ln>
-        </p:spPr>
-      </p:pic>
-      <p:sp>
-        <p:nvSpPr>
-          <p:cNvPr id="6" name="TextBox 5"/>
-          <p:cNvSpPr txBox="1"/>
-          <p:nvPr/>
-        </p:nvSpPr>
-        <p:spPr>
-          <a:xfrm>
-            <a:off x="226950" y="2215726"/>
-            <a:ext cx="2054665" cy="300082"/>
+        <p:spPr bwMode="auto">
+          <a:xfrm>
+            <a:off x="3416801" y="2403249"/>
+            <a:ext cx="2583278" cy="1852567"/>
           </a:xfrm>
           <a:prstGeom prst="rect">
             <a:avLst/>
           </a:prstGeom>
           <a:noFill/>
-        </p:spPr>
-        <p:txBody>
-          <a:bodyPr wrap="none" rtlCol="0">
-            <a:spAutoFit/>
-          </a:bodyPr>
-          <a:lstStyle/>
-          <a:p>
-            <a:r>
-              <a:rPr lang="en-US" sz="1350" dirty="0"/>
-              <a:t>Classic Notebook Interface</a:t>
-            </a:r>
-          </a:p>
-        </p:txBody>
-      </p:sp>
-      <p:sp>
-        <p:nvSpPr>
-          <p:cNvPr id="7" name="TextBox 6"/>
-          <p:cNvSpPr txBox="1"/>
+          <a:extLst>
+            <a:ext uri="{909E8E84-426E-40DD-AFC4-6F175D3DCCD1}">
+              <a14:hiddenFill xmlns:a14="http://schemas.microsoft.com/office/drawing/2010/main">
+                <a:solidFill>
+                  <a:srgbClr val="FFFFFF"/>
+                </a:solidFill>
+              </a14:hiddenFill>
+            </a:ext>
+          </a:extLst>
+        </p:spPr>
+      </p:pic>
+      <p:pic>
+        <p:nvPicPr>
+          <p:cNvPr id="1032" name="Picture 8" descr="Image result for kubernetes logo"/>
+          <p:cNvPicPr>
+            <a:picLocks noChangeAspect="1" noChangeArrowheads="1"/>
+          </p:cNvPicPr>
           <p:nvPr/>
-        </p:nvSpPr>
-        <p:spPr>
-          <a:xfrm>
-            <a:off x="4839067" y="2148432"/>
-            <a:ext cx="1899174" cy="300082"/>
+        </p:nvPicPr>
+        <p:blipFill>
+          <a:blip r:embed="rId4" cstate="print">
+            <a:extLst>
+              <a:ext uri="{28A0092B-C50C-407E-A947-70E740481C1C}">
+                <a14:useLocalDpi xmlns:a14="http://schemas.microsoft.com/office/drawing/2010/main" val="0"/>
+              </a:ext>
+            </a:extLst>
+          </a:blip>
+          <a:srcRect/>
+          <a:stretch>
+            <a:fillRect/>
+          </a:stretch>
+        </p:blipFill>
+        <p:spPr bwMode="auto">
+          <a:xfrm>
+            <a:off x="6583824" y="2296641"/>
+            <a:ext cx="2261363" cy="2195407"/>
           </a:xfrm>
           <a:prstGeom prst="rect">
             <a:avLst/>
           </a:prstGeom>
           <a:noFill/>
-        </p:spPr>
-        <p:txBody>
-          <a:bodyPr wrap="none" rtlCol="0">
-            <a:spAutoFit/>
-          </a:bodyPr>
-          <a:lstStyle/>
-          <a:p>
-            <a:r>
-              <a:rPr lang="en-US" sz="1350" dirty="0"/>
-              <a:t>New </a:t>
-            </a:r>
-            <a:r>
-              <a:rPr lang="en-US" sz="1350" dirty="0" err="1"/>
-              <a:t>JupterLab</a:t>
-            </a:r>
-            <a:r>
-              <a:rPr lang="en-US" sz="1350" dirty="0"/>
-              <a:t> Interface</a:t>
-            </a:r>
-          </a:p>
-        </p:txBody>
-      </p:sp>
+          <a:extLst>
+            <a:ext uri="{909E8E84-426E-40DD-AFC4-6F175D3DCCD1}">
+              <a14:hiddenFill xmlns:a14="http://schemas.microsoft.com/office/drawing/2010/main">
+                <a:solidFill>
+                  <a:srgbClr val="FFFFFF"/>
+                </a:solidFill>
+              </a14:hiddenFill>
+            </a:ext>
+          </a:extLst>
+        </p:spPr>
+      </p:pic>
     </p:spTree>
     <p:extLst>
       <p:ext uri="{BB962C8B-B14F-4D97-AF65-F5344CB8AC3E}">
-        <p14:creationId xmlns:p14="http://schemas.microsoft.com/office/powerpoint/2010/main" val="2419522536"/>
+        <p14:creationId xmlns:p14="http://schemas.microsoft.com/office/powerpoint/2010/main" val="879418665"/>
       </p:ext>
     </p:extLst>
   </p:cSld>
@@ -5196,8 +5249,8 @@
         </p:nvSpPr>
         <p:spPr>
           <a:xfrm>
-            <a:off x="215623" y="206840"/>
-            <a:ext cx="5194180" cy="1325563"/>
+            <a:off x="226950" y="218813"/>
+            <a:ext cx="7886700" cy="1325563"/>
           </a:xfrm>
         </p:spPr>
         <p:txBody>
@@ -5205,12 +5258,16 @@
           <a:lstStyle/>
           <a:p>
             <a:r>
+              <a:rPr lang="en-US" dirty="0" smtClean="0"/>
+              <a:t>Classic Notebook or </a:t>
+            </a:r>
+            <a:r>
               <a:rPr lang="en-US" dirty="0" err="1" smtClean="0"/>
-              <a:t>nbgitpuller</a:t>
+              <a:t>JupyterLab</a:t>
             </a:r>
             <a:r>
               <a:rPr lang="en-US" dirty="0" smtClean="0"/>
-              <a:t> Extension</a:t>
+              <a:t> Interface</a:t>
             </a:r>
             <a:endParaRPr lang="en-US" dirty="0"/>
           </a:p>
@@ -5218,7 +5275,7 @@
       </p:sp>
       <p:sp>
         <p:nvSpPr>
-          <p:cNvPr id="6" name="Slide Number Placeholder 5"/>
+          <p:cNvPr id="8" name="Slide Number Placeholder 7"/>
           <p:cNvSpPr>
             <a:spLocks noGrp="1"/>
           </p:cNvSpPr>
@@ -5241,52 +5298,48 @@
       </p:sp>
       <p:pic>
         <p:nvPicPr>
-          <p:cNvPr id="2050" name="Picture 2" descr="nbgitpull URL building App"/>
+          <p:cNvPr id="4" name="Picture 3"/>
           <p:cNvPicPr>
-            <a:picLocks noChangeAspect="1" noChangeArrowheads="1"/>
+            <a:picLocks noChangeAspect="1"/>
           </p:cNvPicPr>
           <p:nvPr/>
         </p:nvPicPr>
-        <p:blipFill rotWithShape="1">
-          <a:blip r:embed="rId2">
+        <p:blipFill>
+          <a:blip r:embed="rId2" cstate="print">
             <a:extLst>
               <a:ext uri="{28A0092B-C50C-407E-A947-70E740481C1C}">
                 <a14:useLocalDpi xmlns:a14="http://schemas.microsoft.com/office/drawing/2010/main" val="0"/>
               </a:ext>
             </a:extLst>
           </a:blip>
-          <a:srcRect t="2527" r="42631"/>
-          <a:stretch/>
+          <a:stretch>
+            <a:fillRect/>
+          </a:stretch>
         </p:blipFill>
-        <p:spPr bwMode="auto">
-          <a:xfrm>
-            <a:off x="215623" y="2515162"/>
-            <a:ext cx="4356377" cy="2169368"/>
+        <p:spPr>
+          <a:xfrm>
+            <a:off x="4910431" y="2528735"/>
+            <a:ext cx="3983874" cy="2560779"/>
           </a:xfrm>
           <a:prstGeom prst="rect">
             <a:avLst/>
           </a:prstGeom>
-          <a:noFill/>
-          <a:extLst>
-            <a:ext uri="{909E8E84-426E-40DD-AFC4-6F175D3DCCD1}">
-              <a14:hiddenFill xmlns:a14="http://schemas.microsoft.com/office/drawing/2010/main">
-                <a:solidFill>
-                  <a:srgbClr val="FFFFFF"/>
-                </a:solidFill>
-              </a14:hiddenFill>
-            </a:ext>
-          </a:extLst>
+          <a:ln>
+            <a:solidFill>
+              <a:schemeClr val="accent1"/>
+            </a:solidFill>
+          </a:ln>
         </p:spPr>
       </p:pic>
       <p:pic>
         <p:nvPicPr>
-          <p:cNvPr id="2052" name="Picture 4" descr="Jupyter Lab after custom link"/>
+          <p:cNvPr id="5" name="Picture 4"/>
           <p:cNvPicPr>
-            <a:picLocks noChangeAspect="1" noChangeArrowheads="1"/>
+            <a:picLocks noChangeAspect="1"/>
           </p:cNvPicPr>
           <p:nvPr/>
         </p:nvPicPr>
-        <p:blipFill rotWithShape="1">
+        <p:blipFill>
           <a:blip r:embed="rId3">
             <a:extLst>
               <a:ext uri="{28A0092B-C50C-407E-A947-70E740481C1C}">
@@ -5294,70 +5347,64 @@
               </a:ext>
             </a:extLst>
           </a:blip>
-          <a:srcRect r="47429"/>
-          <a:stretch/>
+          <a:stretch>
+            <a:fillRect/>
+          </a:stretch>
         </p:blipFill>
-        <p:spPr bwMode="auto">
-          <a:xfrm>
-            <a:off x="4989545" y="2222458"/>
-            <a:ext cx="3792894" cy="2462072"/>
+        <p:spPr>
+          <a:xfrm>
+            <a:off x="226950" y="2544536"/>
+            <a:ext cx="4431314" cy="2561219"/>
+          </a:xfrm>
+          <a:prstGeom prst="rect">
+            <a:avLst/>
+          </a:prstGeom>
+          <a:ln>
+            <a:solidFill>
+              <a:schemeClr val="accent1"/>
+            </a:solidFill>
+          </a:ln>
+        </p:spPr>
+      </p:pic>
+      <p:sp>
+        <p:nvSpPr>
+          <p:cNvPr id="6" name="TextBox 5"/>
+          <p:cNvSpPr txBox="1"/>
+          <p:nvPr/>
+        </p:nvSpPr>
+        <p:spPr>
+          <a:xfrm>
+            <a:off x="226950" y="2215726"/>
+            <a:ext cx="2054665" cy="300082"/>
           </a:xfrm>
           <a:prstGeom prst="rect">
             <a:avLst/>
           </a:prstGeom>
           <a:noFill/>
-          <a:extLst>
-            <a:ext uri="{909E8E84-426E-40DD-AFC4-6F175D3DCCD1}">
-              <a14:hiddenFill xmlns:a14="http://schemas.microsoft.com/office/drawing/2010/main">
-                <a:solidFill>
-                  <a:srgbClr val="FFFFFF"/>
-                </a:solidFill>
-              </a14:hiddenFill>
-            </a:ext>
-          </a:extLst>
-        </p:spPr>
-      </p:pic>
-      <p:sp>
-        <p:nvSpPr>
-          <p:cNvPr id="4" name="Rectangle 3"/>
-          <p:cNvSpPr/>
-          <p:nvPr/>
-        </p:nvSpPr>
-        <p:spPr>
-          <a:xfrm>
-            <a:off x="1783854" y="5289608"/>
-            <a:ext cx="5324791" cy="461665"/>
-          </a:xfrm>
-          <a:prstGeom prst="rect">
-            <a:avLst/>
-          </a:prstGeom>
-        </p:spPr>
-        <p:txBody>
-          <a:bodyPr wrap="none">
+        </p:spPr>
+        <p:txBody>
+          <a:bodyPr wrap="none" rtlCol="0">
             <a:spAutoFit/>
           </a:bodyPr>
           <a:lstStyle/>
           <a:p>
             <a:r>
-              <a:rPr lang="en-US" sz="2400" dirty="0">
-                <a:hlinkClick r:id="rId4"/>
-              </a:rPr>
-              <a:t>https://jupyterhub.github.io/nbgitpuller/</a:t>
-            </a:r>
-            <a:endParaRPr lang="en-US" sz="2400" dirty="0"/>
-          </a:p>
-        </p:txBody>
-      </p:sp>
-      <p:sp>
-        <p:nvSpPr>
-          <p:cNvPr id="5" name="TextBox 4"/>
+              <a:rPr lang="en-US" sz="1350" dirty="0"/>
+              <a:t>Classic Notebook Interface</a:t>
+            </a:r>
+          </a:p>
+        </p:txBody>
+      </p:sp>
+      <p:sp>
+        <p:nvSpPr>
+          <p:cNvPr id="7" name="TextBox 6"/>
           <p:cNvSpPr txBox="1"/>
           <p:nvPr/>
         </p:nvSpPr>
         <p:spPr>
           <a:xfrm>
-            <a:off x="4989545" y="1923440"/>
-            <a:ext cx="3572453" cy="300082"/>
+            <a:off x="4839067" y="2148432"/>
+            <a:ext cx="1899174" cy="300082"/>
           </a:xfrm>
           <a:prstGeom prst="rect">
             <a:avLst/>
@@ -5372,53 +5419,23 @@
           <a:p>
             <a:r>
               <a:rPr lang="en-US" sz="1350" dirty="0"/>
-              <a:t>GitHub Repo </a:t>
-            </a:r>
-            <a:r>
-              <a:rPr lang="en-US" sz="1350" dirty="0" smtClean="0"/>
-              <a:t>Pre-populates </a:t>
+              <a:t>New </a:t>
+            </a:r>
+            <a:r>
+              <a:rPr lang="en-US" sz="1350" dirty="0" err="1"/>
+              <a:t>JupterLab</a:t>
             </a:r>
             <a:r>
               <a:rPr lang="en-US" sz="1350" dirty="0"/>
-              <a:t>in user’s file system </a:t>
-            </a:r>
-          </a:p>
-        </p:txBody>
-      </p:sp>
-      <p:sp>
-        <p:nvSpPr>
-          <p:cNvPr id="9" name="TextBox 8"/>
-          <p:cNvSpPr txBox="1"/>
-          <p:nvPr/>
-        </p:nvSpPr>
-        <p:spPr>
-          <a:xfrm>
-            <a:off x="215623" y="1923440"/>
-            <a:ext cx="2006640" cy="300082"/>
-          </a:xfrm>
-          <a:prstGeom prst="rect">
-            <a:avLst/>
-          </a:prstGeom>
-          <a:noFill/>
-        </p:spPr>
-        <p:txBody>
-          <a:bodyPr wrap="none" rtlCol="0">
-            <a:spAutoFit/>
-          </a:bodyPr>
-          <a:lstStyle/>
-          <a:p>
-            <a:r>
-              <a:rPr lang="en-US" sz="1350" dirty="0" smtClean="0"/>
-              <a:t>Build a URL for your Users</a:t>
-            </a:r>
-            <a:endParaRPr lang="en-US" sz="1350" dirty="0"/>
+              <a:t> Interface</a:t>
+            </a:r>
           </a:p>
         </p:txBody>
       </p:sp>
     </p:spTree>
     <p:extLst>
       <p:ext uri="{BB962C8B-B14F-4D97-AF65-F5344CB8AC3E}">
-        <p14:creationId xmlns:p14="http://schemas.microsoft.com/office/powerpoint/2010/main" val="2834832161"/>
+        <p14:creationId xmlns:p14="http://schemas.microsoft.com/office/powerpoint/2010/main" val="2419522536"/>
       </p:ext>
     </p:extLst>
   </p:cSld>
@@ -5464,48 +5481,21 @@
         </p:nvSpPr>
         <p:spPr>
           <a:xfrm>
-            <a:off x="193814" y="313367"/>
-            <a:ext cx="7886700" cy="1325563"/>
-          </a:xfrm>
-        </p:spPr>
-        <p:txBody>
-          <a:bodyPr>
-            <a:normAutofit fontScale="90000"/>
-          </a:bodyPr>
-          <a:lstStyle/>
-          <a:p>
+            <a:off x="215623" y="206840"/>
+            <a:ext cx="5194180" cy="1325563"/>
+          </a:xfrm>
+        </p:spPr>
+        <p:txBody>
+          <a:bodyPr/>
+          <a:lstStyle/>
+          <a:p>
+            <a:r>
+              <a:rPr lang="en-US" dirty="0" err="1" smtClean="0"/>
+              <a:t>nbgitpuller</a:t>
+            </a:r>
             <a:r>
               <a:rPr lang="en-US" dirty="0" smtClean="0"/>
-              <a:t>Try your own deployment: </a:t>
-            </a:r>
-            <a:r>
-              <a:rPr lang="en-US" dirty="0" smtClean="0">
-                <a:hlinkClick r:id="rId2"/>
-              </a:rPr>
-              <a:t>https://professorkazarinoff.github.io</a:t>
-            </a:r>
-            <a:r>
-              <a:rPr lang="en-US" dirty="0" smtClean="0">
-                <a:hlinkClick r:id="rId2"/>
-              </a:rPr>
-              <a:t>/</a:t>
-            </a:r>
-            <a:br>
-              <a:rPr lang="en-US" dirty="0" smtClean="0">
-                <a:hlinkClick r:id="rId2"/>
-              </a:rPr>
-            </a:br>
-            <a:r>
-              <a:rPr lang="en-US" dirty="0" smtClean="0">
-                <a:hlinkClick r:id="rId2"/>
-              </a:rPr>
-              <a:t>jupyterhub-engr101</a:t>
-            </a:r>
-            <a:r>
-              <a:rPr lang="en-US" dirty="0" smtClean="0">
-                <a:hlinkClick r:id="rId2"/>
-              </a:rPr>
-              <a:t>/</a:t>
+              <a:t> Extension</a:t>
             </a:r>
             <a:endParaRPr lang="en-US" dirty="0"/>
           </a:p>
@@ -5513,7 +5503,7 @@
       </p:sp>
       <p:sp>
         <p:nvSpPr>
-          <p:cNvPr id="3" name="Slide Number Placeholder 2"/>
+          <p:cNvPr id="6" name="Slide Number Placeholder 5"/>
           <p:cNvSpPr>
             <a:spLocks noGrp="1"/>
           </p:cNvSpPr>
@@ -5536,32 +5526,184 @@
       </p:sp>
       <p:pic>
         <p:nvPicPr>
-          <p:cNvPr id="5" name="Picture 4"/>
+          <p:cNvPr id="2050" name="Picture 2" descr="nbgitpull URL building App"/>
           <p:cNvPicPr>
-            <a:picLocks noChangeAspect="1"/>
+            <a:picLocks noChangeAspect="1" noChangeArrowheads="1"/>
           </p:cNvPicPr>
           <p:nvPr/>
         </p:nvPicPr>
-        <p:blipFill>
-          <a:blip r:embed="rId3"/>
-          <a:stretch>
-            <a:fillRect/>
-          </a:stretch>
+        <p:blipFill rotWithShape="1">
+          <a:blip r:embed="rId2">
+            <a:extLst>
+              <a:ext uri="{28A0092B-C50C-407E-A947-70E740481C1C}">
+                <a14:useLocalDpi xmlns:a14="http://schemas.microsoft.com/office/drawing/2010/main" val="0"/>
+              </a:ext>
+            </a:extLst>
+          </a:blip>
+          <a:srcRect t="2527" r="42631"/>
+          <a:stretch/>
         </p:blipFill>
-        <p:spPr>
-          <a:xfrm>
-            <a:off x="1134716" y="1934255"/>
-            <a:ext cx="6577299" cy="4551117"/>
+        <p:spPr bwMode="auto">
+          <a:xfrm>
+            <a:off x="215623" y="2515162"/>
+            <a:ext cx="4356377" cy="2169368"/>
           </a:xfrm>
           <a:prstGeom prst="rect">
             <a:avLst/>
           </a:prstGeom>
+          <a:noFill/>
+          <a:extLst>
+            <a:ext uri="{909E8E84-426E-40DD-AFC4-6F175D3DCCD1}">
+              <a14:hiddenFill xmlns:a14="http://schemas.microsoft.com/office/drawing/2010/main">
+                <a:solidFill>
+                  <a:srgbClr val="FFFFFF"/>
+                </a:solidFill>
+              </a14:hiddenFill>
+            </a:ext>
+          </a:extLst>
         </p:spPr>
       </p:pic>
+      <p:pic>
+        <p:nvPicPr>
+          <p:cNvPr id="2052" name="Picture 4" descr="Jupyter Lab after custom link"/>
+          <p:cNvPicPr>
+            <a:picLocks noChangeAspect="1" noChangeArrowheads="1"/>
+          </p:cNvPicPr>
+          <p:nvPr/>
+        </p:nvPicPr>
+        <p:blipFill rotWithShape="1">
+          <a:blip r:embed="rId3">
+            <a:extLst>
+              <a:ext uri="{28A0092B-C50C-407E-A947-70E740481C1C}">
+                <a14:useLocalDpi xmlns:a14="http://schemas.microsoft.com/office/drawing/2010/main" val="0"/>
+              </a:ext>
+            </a:extLst>
+          </a:blip>
+          <a:srcRect r="47429"/>
+          <a:stretch/>
+        </p:blipFill>
+        <p:spPr bwMode="auto">
+          <a:xfrm>
+            <a:off x="4989545" y="2222458"/>
+            <a:ext cx="3792894" cy="2462072"/>
+          </a:xfrm>
+          <a:prstGeom prst="rect">
+            <a:avLst/>
+          </a:prstGeom>
+          <a:noFill/>
+          <a:extLst>
+            <a:ext uri="{909E8E84-426E-40DD-AFC4-6F175D3DCCD1}">
+              <a14:hiddenFill xmlns:a14="http://schemas.microsoft.com/office/drawing/2010/main">
+                <a:solidFill>
+                  <a:srgbClr val="FFFFFF"/>
+                </a:solidFill>
+              </a14:hiddenFill>
+            </a:ext>
+          </a:extLst>
+        </p:spPr>
+      </p:pic>
+      <p:sp>
+        <p:nvSpPr>
+          <p:cNvPr id="4" name="Rectangle 3"/>
+          <p:cNvSpPr/>
+          <p:nvPr/>
+        </p:nvSpPr>
+        <p:spPr>
+          <a:xfrm>
+            <a:off x="1783854" y="5289608"/>
+            <a:ext cx="5324791" cy="461665"/>
+          </a:xfrm>
+          <a:prstGeom prst="rect">
+            <a:avLst/>
+          </a:prstGeom>
+        </p:spPr>
+        <p:txBody>
+          <a:bodyPr wrap="none">
+            <a:spAutoFit/>
+          </a:bodyPr>
+          <a:lstStyle/>
+          <a:p>
+            <a:r>
+              <a:rPr lang="en-US" sz="2400" dirty="0">
+                <a:hlinkClick r:id="rId4"/>
+              </a:rPr>
+              <a:t>https://jupyterhub.github.io/nbgitpuller/</a:t>
+            </a:r>
+            <a:endParaRPr lang="en-US" sz="2400" dirty="0"/>
+          </a:p>
+        </p:txBody>
+      </p:sp>
+      <p:sp>
+        <p:nvSpPr>
+          <p:cNvPr id="5" name="TextBox 4"/>
+          <p:cNvSpPr txBox="1"/>
+          <p:nvPr/>
+        </p:nvSpPr>
+        <p:spPr>
+          <a:xfrm>
+            <a:off x="4989545" y="1923440"/>
+            <a:ext cx="3572453" cy="300082"/>
+          </a:xfrm>
+          <a:prstGeom prst="rect">
+            <a:avLst/>
+          </a:prstGeom>
+          <a:noFill/>
+        </p:spPr>
+        <p:txBody>
+          <a:bodyPr wrap="none" rtlCol="0">
+            <a:spAutoFit/>
+          </a:bodyPr>
+          <a:lstStyle/>
+          <a:p>
+            <a:r>
+              <a:rPr lang="en-US" sz="1350" dirty="0"/>
+              <a:t>GitHub Repo </a:t>
+            </a:r>
+            <a:r>
+              <a:rPr lang="en-US" sz="1350" dirty="0" smtClean="0"/>
+              <a:t>Pre-populates </a:t>
+            </a:r>
+            <a:r>
+              <a:rPr lang="en-US" sz="1350" dirty="0"/>
+              <a:t>in user’s file system </a:t>
+            </a:r>
+          </a:p>
+        </p:txBody>
+      </p:sp>
+      <p:sp>
+        <p:nvSpPr>
+          <p:cNvPr id="9" name="TextBox 8"/>
+          <p:cNvSpPr txBox="1"/>
+          <p:nvPr/>
+        </p:nvSpPr>
+        <p:spPr>
+          <a:xfrm>
+            <a:off x="215623" y="1923440"/>
+            <a:ext cx="2006640" cy="300082"/>
+          </a:xfrm>
+          <a:prstGeom prst="rect">
+            <a:avLst/>
+          </a:prstGeom>
+          <a:noFill/>
+        </p:spPr>
+        <p:txBody>
+          <a:bodyPr wrap="none" rtlCol="0">
+            <a:spAutoFit/>
+          </a:bodyPr>
+          <a:lstStyle/>
+          <a:p>
+            <a:r>
+              <a:rPr lang="en-US" sz="1350" dirty="0" smtClean="0"/>
+              <a:t>Build a URL for your Users</a:t>
+            </a:r>
+            <a:endParaRPr lang="en-US" sz="1350" dirty="0"/>
+          </a:p>
+        </p:txBody>
+      </p:sp>
     </p:spTree>
     <p:extLst>
       <p:ext uri="{BB962C8B-B14F-4D97-AF65-F5344CB8AC3E}">
-        <p14:creationId xmlns:p14="http://schemas.microsoft.com/office/powerpoint/2010/main" val="3049692848"/>
+        <p14:creationId xmlns:p14="http://schemas.microsoft.com/office/powerpoint/2010/main" val="2834832161"/>
       </p:ext>
     </p:extLst>
   </p:cSld>
@@ -5607,17 +5749,36 @@
         </p:nvSpPr>
         <p:spPr>
           <a:xfrm>
-            <a:off x="188703" y="149466"/>
+            <a:off x="193814" y="313367"/>
             <a:ext cx="7886700" cy="1325563"/>
           </a:xfrm>
         </p:spPr>
         <p:txBody>
-          <a:bodyPr/>
+          <a:bodyPr>
+            <a:normAutofit fontScale="90000"/>
+          </a:bodyPr>
           <a:lstStyle/>
           <a:p>
             <a:r>
               <a:rPr lang="en-US" dirty="0" smtClean="0"/>
-              <a:t>Lessons Learned</a:t>
+              <a:t>Try your own deployment: </a:t>
+            </a:r>
+            <a:r>
+              <a:rPr lang="en-US" dirty="0" smtClean="0">
+                <a:hlinkClick r:id="rId2"/>
+              </a:rPr>
+              <a:t>https://professorkazarinoff.github.io/</a:t>
+            </a:r>
+            <a:br>
+              <a:rPr lang="en-US" dirty="0" smtClean="0">
+                <a:hlinkClick r:id="rId2"/>
+              </a:rPr>
+            </a:br>
+            <a:r>
+              <a:rPr lang="en-US" dirty="0" smtClean="0">
+                <a:hlinkClick r:id="rId2"/>
+              </a:rPr>
+              <a:t>jupyterhub-engr101/</a:t>
             </a:r>
             <a:endParaRPr lang="en-US" dirty="0"/>
           </a:p>
@@ -5625,111 +5786,7 @@
       </p:sp>
       <p:sp>
         <p:nvSpPr>
-          <p:cNvPr id="3" name="Content Placeholder 2"/>
-          <p:cNvSpPr>
-            <a:spLocks noGrp="1"/>
-          </p:cNvSpPr>
-          <p:nvPr>
-            <p:ph idx="1"/>
-          </p:nvPr>
-        </p:nvSpPr>
-        <p:spPr>
-          <a:xfrm>
-            <a:off x="335352" y="1833114"/>
-            <a:ext cx="7886700" cy="4351338"/>
-          </a:xfrm>
-          <a:ln>
-            <a:noFill/>
-          </a:ln>
-        </p:spPr>
-        <p:txBody>
-          <a:bodyPr>
-            <a:normAutofit fontScale="92500" lnSpcReduction="10000"/>
-          </a:bodyPr>
-          <a:lstStyle/>
-          <a:p>
-            <a:pPr marL="0" indent="0">
-              <a:buNone/>
-            </a:pPr>
-            <a:endParaRPr lang="en-US" dirty="0" smtClean="0"/>
-          </a:p>
-          <a:p>
-            <a:r>
-              <a:rPr lang="en-US" dirty="0" smtClean="0"/>
-              <a:t>Authentication can be tricky. Linux does not like usernames with special characters</a:t>
-            </a:r>
-          </a:p>
-          <a:p>
-            <a:r>
-              <a:rPr lang="en-US" dirty="0" smtClean="0"/>
-              <a:t>A $5/month server works with a few users. </a:t>
-            </a:r>
-            <a:br>
-              <a:rPr lang="en-US" dirty="0" smtClean="0"/>
-            </a:br>
-            <a:r>
-              <a:rPr lang="en-US" dirty="0" smtClean="0"/>
-              <a:t>25 users overloads a $5/month server, </a:t>
-            </a:r>
-            <a:br>
-              <a:rPr lang="en-US" dirty="0" smtClean="0"/>
-            </a:br>
-            <a:r>
-              <a:rPr lang="en-US" dirty="0" smtClean="0"/>
-              <a:t>use $40/month server for a class.</a:t>
-            </a:r>
-          </a:p>
-          <a:p>
-            <a:r>
-              <a:rPr lang="en-US" dirty="0" smtClean="0"/>
-              <a:t>Custo</a:t>
-            </a:r>
-            <a:r>
-              <a:rPr lang="en-US" dirty="0" smtClean="0"/>
-              <a:t>m log-in page is possible, but takes work </a:t>
-            </a:r>
-            <a:br>
-              <a:rPr lang="en-US" dirty="0" smtClean="0"/>
-            </a:br>
-            <a:r>
-              <a:rPr lang="en-US" dirty="0" smtClean="0"/>
-              <a:t>(html and </a:t>
-            </a:r>
-            <a:r>
-              <a:rPr lang="en-US" dirty="0" err="1" smtClean="0"/>
-              <a:t>css</a:t>
-            </a:r>
-            <a:r>
-              <a:rPr lang="en-US" dirty="0" smtClean="0"/>
-              <a:t>)</a:t>
-            </a:r>
-          </a:p>
-          <a:p>
-            <a:r>
-              <a:rPr lang="en-US" dirty="0" smtClean="0"/>
-              <a:t>Use a cull idle servers script to save resources</a:t>
-            </a:r>
-          </a:p>
-          <a:p>
-            <a:r>
-              <a:rPr lang="en-US" dirty="0" smtClean="0"/>
-              <a:t>Document: You may want to spin up a new </a:t>
-            </a:r>
-            <a:r>
-              <a:rPr lang="en-US" dirty="0" err="1" smtClean="0"/>
-              <a:t>JupyterHub</a:t>
-            </a:r>
-            <a:r>
-              <a:rPr lang="en-US" dirty="0" smtClean="0"/>
-              <a:t> instance in the future.</a:t>
-            </a:r>
-            <a:endParaRPr lang="en-US" dirty="0"/>
-          </a:p>
-        </p:txBody>
-      </p:sp>
-      <p:sp>
-        <p:nvSpPr>
-          <p:cNvPr id="4" name="Slide Number Placeholder 3"/>
+          <p:cNvPr id="3" name="Slide Number Placeholder 2"/>
           <p:cNvSpPr>
             <a:spLocks noGrp="1"/>
           </p:cNvSpPr>
@@ -5746,55 +5803,38 @@
               <a:rPr lang="en-US" smtClean="0"/>
               <a:t>17</a:t>
             </a:fld>
-            <a:endParaRPr lang="en-US" dirty="0"/>
+            <a:endParaRPr lang="en-US"/>
           </a:p>
         </p:txBody>
       </p:sp>
       <p:pic>
         <p:nvPicPr>
-          <p:cNvPr id="7170" name="Picture 2" descr="Image result for lightbulb icon"/>
+          <p:cNvPr id="5" name="Picture 4"/>
           <p:cNvPicPr>
-            <a:picLocks noChangeAspect="1" noChangeArrowheads="1"/>
+            <a:picLocks noChangeAspect="1"/>
           </p:cNvPicPr>
           <p:nvPr/>
         </p:nvPicPr>
         <p:blipFill>
-          <a:blip r:embed="rId2" cstate="print">
-            <a:extLst>
-              <a:ext uri="{28A0092B-C50C-407E-A947-70E740481C1C}">
-                <a14:useLocalDpi xmlns:a14="http://schemas.microsoft.com/office/drawing/2010/main" val="0"/>
-              </a:ext>
-            </a:extLst>
-          </a:blip>
-          <a:srcRect/>
+          <a:blip r:embed="rId3"/>
           <a:stretch>
             <a:fillRect/>
           </a:stretch>
         </p:blipFill>
-        <p:spPr bwMode="auto">
-          <a:xfrm>
-            <a:off x="6599762" y="0"/>
-            <a:ext cx="2371710" cy="2775579"/>
+        <p:spPr>
+          <a:xfrm>
+            <a:off x="1134716" y="1934255"/>
+            <a:ext cx="6577299" cy="4551117"/>
           </a:xfrm>
           <a:prstGeom prst="rect">
             <a:avLst/>
           </a:prstGeom>
-          <a:noFill/>
-          <a:extLst>
-            <a:ext uri="{909E8E84-426E-40DD-AFC4-6F175D3DCCD1}">
-              <a14:hiddenFill xmlns:a14="http://schemas.microsoft.com/office/drawing/2010/main">
-                <a:solidFill>
-                  <a:srgbClr val="FFFFFF"/>
-                </a:solidFill>
-              </a14:hiddenFill>
-            </a:ext>
-          </a:extLst>
         </p:spPr>
       </p:pic>
     </p:spTree>
     <p:extLst>
       <p:ext uri="{BB962C8B-B14F-4D97-AF65-F5344CB8AC3E}">
-        <p14:creationId xmlns:p14="http://schemas.microsoft.com/office/powerpoint/2010/main" val="1449107838"/>
+        <p14:creationId xmlns:p14="http://schemas.microsoft.com/office/powerpoint/2010/main" val="3049692848"/>
       </p:ext>
     </p:extLst>
   </p:cSld>
@@ -5840,7 +5880,7 @@
         </p:nvSpPr>
         <p:spPr>
           <a:xfrm>
-            <a:off x="171450" y="183971"/>
+            <a:off x="188703" y="149466"/>
             <a:ext cx="7886700" cy="1325563"/>
           </a:xfrm>
         </p:spPr>
@@ -5850,7 +5890,7 @@
           <a:p>
             <a:r>
               <a:rPr lang="en-US" dirty="0" smtClean="0"/>
-              <a:t>Questions?</a:t>
+              <a:t>Lessons Learned</a:t>
             </a:r>
             <a:endParaRPr lang="en-US" dirty="0"/>
           </a:p>
@@ -5868,154 +5908,97 @@
         </p:nvSpPr>
         <p:spPr>
           <a:xfrm>
-            <a:off x="628650" y="1603393"/>
-            <a:ext cx="7886700" cy="4210812"/>
-          </a:xfrm>
+            <a:off x="335352" y="1833114"/>
+            <a:ext cx="7886700" cy="4351338"/>
+          </a:xfrm>
+          <a:ln>
+            <a:noFill/>
+          </a:ln>
         </p:spPr>
         <p:txBody>
           <a:bodyPr>
-            <a:noAutofit/>
+            <a:normAutofit fontScale="92500" lnSpcReduction="10000"/>
           </a:bodyPr>
           <a:lstStyle/>
           <a:p>
             <a:pPr marL="0" indent="0">
               <a:buNone/>
             </a:pPr>
-            <a:endParaRPr lang="en-US" sz="2400" dirty="0"/>
-          </a:p>
-          <a:p>
-            <a:pPr>
-              <a:lnSpc>
-                <a:spcPct val="120000"/>
-              </a:lnSpc>
-            </a:pPr>
-            <a:r>
-              <a:rPr lang="en-US" sz="2400" dirty="0" smtClean="0"/>
-              <a:t>Slides: </a:t>
-            </a:r>
-            <a:r>
-              <a:rPr lang="en-US" sz="2400" dirty="0" smtClean="0">
-                <a:hlinkClick r:id="rId2"/>
-              </a:rPr>
-              <a:t>github.com/</a:t>
-            </a:r>
-            <a:r>
-              <a:rPr lang="en-US" sz="2400" dirty="0" err="1" smtClean="0">
-                <a:hlinkClick r:id="rId2"/>
-              </a:rPr>
-              <a:t>ProfessorKazarinoff</a:t>
-            </a:r>
-            <a:r>
-              <a:rPr lang="en-US" sz="2400" dirty="0" smtClean="0">
-                <a:hlinkClick r:id="rId2"/>
-              </a:rPr>
-              <a:t>/PyPDXWest-2019-10</a:t>
-            </a:r>
-            <a:endParaRPr lang="en-US" sz="2400" dirty="0" smtClean="0"/>
-          </a:p>
-          <a:p>
-            <a:pPr>
-              <a:lnSpc>
-                <a:spcPct val="120000"/>
-              </a:lnSpc>
-            </a:pPr>
-            <a:r>
-              <a:rPr lang="en-US" sz="2400" dirty="0" smtClean="0"/>
-              <a:t>My </a:t>
-            </a:r>
-            <a:r>
-              <a:rPr lang="en-US" sz="2400" dirty="0" err="1" smtClean="0"/>
+            <a:endParaRPr lang="en-US" dirty="0" smtClean="0"/>
+          </a:p>
+          <a:p>
+            <a:r>
+              <a:rPr lang="en-US" dirty="0" smtClean="0"/>
+              <a:t>Authentication can be tricky. Linux does not like usernames with special characters</a:t>
+            </a:r>
+          </a:p>
+          <a:p>
+            <a:r>
+              <a:rPr lang="en-US" dirty="0" smtClean="0"/>
+              <a:t>A $5/month server works with a few users. </a:t>
+            </a:r>
+            <a:br>
+              <a:rPr lang="en-US" dirty="0" smtClean="0"/>
+            </a:br>
+            <a:r>
+              <a:rPr lang="en-US" dirty="0" smtClean="0"/>
+              <a:t>25 users overloads a $5/month server, </a:t>
+            </a:r>
+            <a:br>
+              <a:rPr lang="en-US" dirty="0" smtClean="0"/>
+            </a:br>
+            <a:r>
+              <a:rPr lang="en-US" dirty="0" smtClean="0"/>
+              <a:t>use $40/month server for a class.</a:t>
+            </a:r>
+          </a:p>
+          <a:p>
+            <a:r>
+              <a:rPr lang="en-US" dirty="0" smtClean="0"/>
+              <a:t>Custom log-in page is possible, but takes work </a:t>
+            </a:r>
+            <a:br>
+              <a:rPr lang="en-US" dirty="0" smtClean="0"/>
+            </a:br>
+            <a:r>
+              <a:rPr lang="en-US" dirty="0" smtClean="0"/>
+              <a:t>(html and </a:t>
+            </a:r>
+            <a:r>
+              <a:rPr lang="en-US" dirty="0" err="1" smtClean="0"/>
+              <a:t>css</a:t>
+            </a:r>
+            <a:r>
+              <a:rPr lang="en-US" dirty="0" smtClean="0"/>
+              <a:t>)</a:t>
+            </a:r>
+          </a:p>
+          <a:p>
+            <a:r>
+              <a:rPr lang="en-US" dirty="0" smtClean="0"/>
+              <a:t>Use a cull idle servers script to save resources</a:t>
+            </a:r>
+          </a:p>
+          <a:p>
+            <a:r>
+              <a:rPr lang="en-US" dirty="0" smtClean="0"/>
+              <a:t>Document: You may want to spin up a new </a:t>
+            </a:r>
+            <a:r>
+              <a:rPr lang="en-US" dirty="0" err="1" smtClean="0"/>
               <a:t>JupyterHub</a:t>
             </a:r>
             <a:r>
-              <a:rPr lang="en-US" sz="2400" dirty="0"/>
-              <a:t> </a:t>
-            </a:r>
-            <a:r>
-              <a:rPr lang="en-US" sz="2400" dirty="0" smtClean="0"/>
-              <a:t>Deployment Docs: </a:t>
-            </a:r>
-            <a:r>
-              <a:rPr lang="en-US" sz="2400" dirty="0">
-                <a:hlinkClick r:id="rId3"/>
-              </a:rPr>
-              <a:t>https://</a:t>
-            </a:r>
-            <a:r>
-              <a:rPr lang="en-US" sz="2400" dirty="0" smtClean="0">
-                <a:hlinkClick r:id="rId3"/>
-              </a:rPr>
-              <a:t>professorkazarinoff.github.io/jupyterhub-engr101</a:t>
-            </a:r>
-            <a:endParaRPr lang="en-US" sz="2400" dirty="0" smtClean="0"/>
-          </a:p>
-          <a:p>
-            <a:pPr>
-              <a:lnSpc>
-                <a:spcPct val="120000"/>
-              </a:lnSpc>
-            </a:pPr>
-            <a:r>
-              <a:rPr lang="en-US" sz="2400" dirty="0" err="1" smtClean="0"/>
-              <a:t>JupyterHub</a:t>
-            </a:r>
-            <a:r>
-              <a:rPr lang="en-US" sz="2400" dirty="0" smtClean="0"/>
-              <a:t> Docs:</a:t>
-            </a:r>
-            <a:br>
-              <a:rPr lang="en-US" sz="2400" dirty="0" smtClean="0"/>
-            </a:br>
-            <a:r>
-              <a:rPr lang="en-US" sz="2400" dirty="0" smtClean="0">
-                <a:hlinkClick r:id="rId4"/>
-              </a:rPr>
-              <a:t>https://</a:t>
-            </a:r>
-            <a:r>
-              <a:rPr lang="en-US" sz="2400" dirty="0">
-                <a:hlinkClick r:id="rId4"/>
-              </a:rPr>
-              <a:t>jupyterhub.readthedocs.io/en/stable</a:t>
-            </a:r>
-            <a:r>
-              <a:rPr lang="en-US" sz="2400" dirty="0" smtClean="0">
-                <a:hlinkClick r:id="rId4"/>
-              </a:rPr>
-              <a:t>/</a:t>
-            </a:r>
-            <a:endParaRPr lang="en-US" sz="2400" dirty="0" smtClean="0"/>
-          </a:p>
-          <a:p>
-            <a:pPr>
-              <a:lnSpc>
-                <a:spcPct val="120000"/>
-              </a:lnSpc>
-            </a:pPr>
-            <a:r>
-              <a:rPr lang="en-US" sz="2400" dirty="0" err="1" smtClean="0"/>
-              <a:t>Nbgitpuller</a:t>
-            </a:r>
-            <a:r>
-              <a:rPr lang="en-US" sz="2400" dirty="0" smtClean="0"/>
-              <a:t> Plugin:</a:t>
-            </a:r>
-            <a:br>
-              <a:rPr lang="en-US" sz="2400" dirty="0" smtClean="0"/>
-            </a:br>
-            <a:r>
-              <a:rPr lang="en-US" sz="2400" dirty="0">
-                <a:hlinkClick r:id="rId5"/>
-              </a:rPr>
-              <a:t>https://jupyterhub.github.io/nbgitpuller/</a:t>
-            </a:r>
-            <a:endParaRPr lang="en-US" sz="2400" dirty="0"/>
-          </a:p>
-        </p:txBody>
-      </p:sp>
-      <p:sp>
-        <p:nvSpPr>
-          <p:cNvPr id="6" name="Slide Number Placeholder 5"/>
+              <a:rPr lang="en-US" dirty="0" smtClean="0"/>
+              <a:t> instance in the future.</a:t>
+            </a:r>
+            <a:endParaRPr lang="en-US" dirty="0"/>
+          </a:p>
+        </p:txBody>
+      </p:sp>
+      <p:sp>
+        <p:nvSpPr>
+          <p:cNvPr id="4" name="Slide Number Placeholder 3"/>
           <p:cNvSpPr>
             <a:spLocks noGrp="1"/>
           </p:cNvSpPr>
@@ -6032,20 +6015,20 @@
               <a:rPr lang="en-US" smtClean="0"/>
               <a:t>18</a:t>
             </a:fld>
-            <a:endParaRPr lang="en-US"/>
+            <a:endParaRPr lang="en-US" dirty="0"/>
           </a:p>
         </p:txBody>
       </p:sp>
       <p:pic>
         <p:nvPicPr>
-          <p:cNvPr id="9218" name="Picture 2" descr="Image result for question icon"/>
+          <p:cNvPr id="7170" name="Picture 2" descr="Image result for lightbulb icon"/>
           <p:cNvPicPr>
             <a:picLocks noChangeAspect="1" noChangeArrowheads="1"/>
           </p:cNvPicPr>
           <p:nvPr/>
         </p:nvPicPr>
         <p:blipFill>
-          <a:blip r:embed="rId6" cstate="print">
+          <a:blip r:embed="rId2" cstate="print">
             <a:extLst>
               <a:ext uri="{28A0092B-C50C-407E-A947-70E740481C1C}">
                 <a14:useLocalDpi xmlns:a14="http://schemas.microsoft.com/office/drawing/2010/main" val="0"/>
@@ -6059,8 +6042,8 @@
         </p:blipFill>
         <p:spPr bwMode="auto">
           <a:xfrm>
-            <a:off x="6894041" y="183971"/>
-            <a:ext cx="1648267" cy="1648267"/>
+            <a:off x="6599762" y="0"/>
+            <a:ext cx="2371710" cy="2775579"/>
           </a:xfrm>
           <a:prstGeom prst="rect">
             <a:avLst/>
@@ -6080,7 +6063,7 @@
     </p:spTree>
     <p:extLst>
       <p:ext uri="{BB962C8B-B14F-4D97-AF65-F5344CB8AC3E}">
-        <p14:creationId xmlns:p14="http://schemas.microsoft.com/office/powerpoint/2010/main" val="1959221333"/>
+        <p14:creationId xmlns:p14="http://schemas.microsoft.com/office/powerpoint/2010/main" val="1449107838"/>
       </p:ext>
     </p:extLst>
   </p:cSld>
@@ -6124,6 +6107,643 @@
             <p:ph type="title"/>
           </p:nvPr>
         </p:nvSpPr>
+        <p:spPr>
+          <a:xfrm>
+            <a:off x="171450" y="183971"/>
+            <a:ext cx="7886700" cy="1325563"/>
+          </a:xfrm>
+        </p:spPr>
+        <p:txBody>
+          <a:bodyPr/>
+          <a:lstStyle/>
+          <a:p>
+            <a:r>
+              <a:rPr lang="en-US" dirty="0" smtClean="0"/>
+              <a:t>Questions?</a:t>
+            </a:r>
+            <a:endParaRPr lang="en-US" dirty="0"/>
+          </a:p>
+        </p:txBody>
+      </p:sp>
+      <p:sp>
+        <p:nvSpPr>
+          <p:cNvPr id="3" name="Content Placeholder 2"/>
+          <p:cNvSpPr>
+            <a:spLocks noGrp="1"/>
+          </p:cNvSpPr>
+          <p:nvPr>
+            <p:ph idx="1"/>
+          </p:nvPr>
+        </p:nvSpPr>
+        <p:spPr>
+          <a:xfrm>
+            <a:off x="628650" y="1603393"/>
+            <a:ext cx="7886700" cy="4210812"/>
+          </a:xfrm>
+        </p:spPr>
+        <p:txBody>
+          <a:bodyPr>
+            <a:noAutofit/>
+          </a:bodyPr>
+          <a:lstStyle/>
+          <a:p>
+            <a:pPr marL="0" indent="0">
+              <a:buNone/>
+            </a:pPr>
+            <a:endParaRPr lang="en-US" sz="2400" dirty="0"/>
+          </a:p>
+          <a:p>
+            <a:pPr>
+              <a:lnSpc>
+                <a:spcPct val="120000"/>
+              </a:lnSpc>
+            </a:pPr>
+            <a:r>
+              <a:rPr lang="en-US" sz="2400" dirty="0" smtClean="0"/>
+              <a:t>Slides: </a:t>
+            </a:r>
+            <a:r>
+              <a:rPr lang="en-US" sz="2400" dirty="0" smtClean="0">
+                <a:hlinkClick r:id="rId2"/>
+              </a:rPr>
+              <a:t>github.com/</a:t>
+            </a:r>
+            <a:r>
+              <a:rPr lang="en-US" sz="2400" dirty="0" err="1" smtClean="0">
+                <a:hlinkClick r:id="rId2"/>
+              </a:rPr>
+              <a:t>ProfessorKazarinoff</a:t>
+            </a:r>
+            <a:r>
+              <a:rPr lang="en-US" sz="2400" dirty="0" smtClean="0">
+                <a:hlinkClick r:id="rId2"/>
+              </a:rPr>
+              <a:t>/PyPDXWest-2019-10</a:t>
+            </a:r>
+            <a:endParaRPr lang="en-US" sz="2400" dirty="0" smtClean="0"/>
+          </a:p>
+          <a:p>
+            <a:pPr>
+              <a:lnSpc>
+                <a:spcPct val="120000"/>
+              </a:lnSpc>
+            </a:pPr>
+            <a:r>
+              <a:rPr lang="en-US" sz="2400" dirty="0" smtClean="0"/>
+              <a:t>My </a:t>
+            </a:r>
+            <a:r>
+              <a:rPr lang="en-US" sz="2400" dirty="0" err="1" smtClean="0"/>
+              <a:t>JupyterHub</a:t>
+            </a:r>
+            <a:r>
+              <a:rPr lang="en-US" sz="2400" dirty="0"/>
+              <a:t> </a:t>
+            </a:r>
+            <a:r>
+              <a:rPr lang="en-US" sz="2400" dirty="0" smtClean="0"/>
+              <a:t>Deployment Docs: </a:t>
+            </a:r>
+            <a:r>
+              <a:rPr lang="en-US" sz="2400" dirty="0">
+                <a:hlinkClick r:id="rId3"/>
+              </a:rPr>
+              <a:t>https://</a:t>
+            </a:r>
+            <a:r>
+              <a:rPr lang="en-US" sz="2400" dirty="0" smtClean="0">
+                <a:hlinkClick r:id="rId3"/>
+              </a:rPr>
+              <a:t>professorkazarinoff.github.io/jupyterhub-engr101</a:t>
+            </a:r>
+            <a:endParaRPr lang="en-US" sz="2400" dirty="0" smtClean="0"/>
+          </a:p>
+          <a:p>
+            <a:pPr>
+              <a:lnSpc>
+                <a:spcPct val="120000"/>
+              </a:lnSpc>
+            </a:pPr>
+            <a:r>
+              <a:rPr lang="en-US" sz="2400" dirty="0" err="1" smtClean="0"/>
+              <a:t>JupyterHub</a:t>
+            </a:r>
+            <a:r>
+              <a:rPr lang="en-US" sz="2400" dirty="0" smtClean="0"/>
+              <a:t> Docs:</a:t>
+            </a:r>
+            <a:br>
+              <a:rPr lang="en-US" sz="2400" dirty="0" smtClean="0"/>
+            </a:br>
+            <a:r>
+              <a:rPr lang="en-US" sz="2400" dirty="0" smtClean="0">
+                <a:hlinkClick r:id="rId4"/>
+              </a:rPr>
+              <a:t>https://</a:t>
+            </a:r>
+            <a:r>
+              <a:rPr lang="en-US" sz="2400" dirty="0">
+                <a:hlinkClick r:id="rId4"/>
+              </a:rPr>
+              <a:t>jupyterhub.readthedocs.io/en/stable</a:t>
+            </a:r>
+            <a:r>
+              <a:rPr lang="en-US" sz="2400" dirty="0" smtClean="0">
+                <a:hlinkClick r:id="rId4"/>
+              </a:rPr>
+              <a:t>/</a:t>
+            </a:r>
+            <a:endParaRPr lang="en-US" sz="2400" dirty="0" smtClean="0"/>
+          </a:p>
+          <a:p>
+            <a:pPr>
+              <a:lnSpc>
+                <a:spcPct val="120000"/>
+              </a:lnSpc>
+            </a:pPr>
+            <a:r>
+              <a:rPr lang="en-US" sz="2400" dirty="0" err="1" smtClean="0"/>
+              <a:t>Nbgitpuller</a:t>
+            </a:r>
+            <a:r>
+              <a:rPr lang="en-US" sz="2400" dirty="0" smtClean="0"/>
+              <a:t> Plugin:</a:t>
+            </a:r>
+            <a:br>
+              <a:rPr lang="en-US" sz="2400" dirty="0" smtClean="0"/>
+            </a:br>
+            <a:r>
+              <a:rPr lang="en-US" sz="2400" dirty="0">
+                <a:hlinkClick r:id="rId5"/>
+              </a:rPr>
+              <a:t>https://jupyterhub.github.io/nbgitpuller/</a:t>
+            </a:r>
+            <a:endParaRPr lang="en-US" sz="2400" dirty="0"/>
+          </a:p>
+        </p:txBody>
+      </p:sp>
+      <p:sp>
+        <p:nvSpPr>
+          <p:cNvPr id="6" name="Slide Number Placeholder 5"/>
+          <p:cNvSpPr>
+            <a:spLocks noGrp="1"/>
+          </p:cNvSpPr>
+          <p:nvPr>
+            <p:ph type="sldNum" sz="quarter" idx="12"/>
+          </p:nvPr>
+        </p:nvSpPr>
+        <p:spPr/>
+        <p:txBody>
+          <a:bodyPr/>
+          <a:lstStyle/>
+          <a:p>
+            <a:fld id="{5E1DF87B-6FA4-4912-8D72-E019C58E9B5A}" type="slidenum">
+              <a:rPr lang="en-US" smtClean="0"/>
+              <a:t>19</a:t>
+            </a:fld>
+            <a:endParaRPr lang="en-US"/>
+          </a:p>
+        </p:txBody>
+      </p:sp>
+      <p:pic>
+        <p:nvPicPr>
+          <p:cNvPr id="9218" name="Picture 2" descr="Image result for question icon"/>
+          <p:cNvPicPr>
+            <a:picLocks noChangeAspect="1" noChangeArrowheads="1"/>
+          </p:cNvPicPr>
+          <p:nvPr/>
+        </p:nvPicPr>
+        <p:blipFill>
+          <a:blip r:embed="rId6" cstate="print">
+            <a:extLst>
+              <a:ext uri="{28A0092B-C50C-407E-A947-70E740481C1C}">
+                <a14:useLocalDpi xmlns:a14="http://schemas.microsoft.com/office/drawing/2010/main" val="0"/>
+              </a:ext>
+            </a:extLst>
+          </a:blip>
+          <a:srcRect/>
+          <a:stretch>
+            <a:fillRect/>
+          </a:stretch>
+        </p:blipFill>
+        <p:spPr bwMode="auto">
+          <a:xfrm>
+            <a:off x="6894041" y="183971"/>
+            <a:ext cx="1648267" cy="1648267"/>
+          </a:xfrm>
+          <a:prstGeom prst="rect">
+            <a:avLst/>
+          </a:prstGeom>
+          <a:noFill/>
+          <a:extLst>
+            <a:ext uri="{909E8E84-426E-40DD-AFC4-6F175D3DCCD1}">
+              <a14:hiddenFill xmlns:a14="http://schemas.microsoft.com/office/drawing/2010/main">
+                <a:solidFill>
+                  <a:srgbClr val="FFFFFF"/>
+                </a:solidFill>
+              </a14:hiddenFill>
+            </a:ext>
+          </a:extLst>
+        </p:spPr>
+      </p:pic>
+    </p:spTree>
+    <p:extLst>
+      <p:ext uri="{BB962C8B-B14F-4D97-AF65-F5344CB8AC3E}">
+        <p14:creationId xmlns:p14="http://schemas.microsoft.com/office/powerpoint/2010/main" val="1959221333"/>
+      </p:ext>
+    </p:extLst>
+  </p:cSld>
+  <p:clrMapOvr>
+    <a:masterClrMapping/>
+  </p:clrMapOvr>
+  <p:timing>
+    <p:tnLst>
+      <p:par>
+        <p:cTn id="1" dur="indefinite" restart="never" nodeType="tmRoot"/>
+      </p:par>
+    </p:tnLst>
+  </p:timing>
+</p:sld>
+</file>
+
+<file path=ppt/slides/slide2.xml><?xml version="1.0" encoding="utf-8"?>
+<p:sld xmlns:a="http://schemas.openxmlformats.org/drawingml/2006/main" xmlns:r="http://schemas.openxmlformats.org/officeDocument/2006/relationships" xmlns:p="http://schemas.openxmlformats.org/presentationml/2006/main">
+  <p:cSld>
+    <p:spTree>
+      <p:nvGrpSpPr>
+        <p:cNvPr id="1" name=""/>
+        <p:cNvGrpSpPr/>
+        <p:nvPr/>
+      </p:nvGrpSpPr>
+      <p:grpSpPr>
+        <a:xfrm>
+          <a:off x="0" y="0"/>
+          <a:ext cx="0" cy="0"/>
+          <a:chOff x="0" y="0"/>
+          <a:chExt cx="0" cy="0"/>
+        </a:xfrm>
+      </p:grpSpPr>
+      <p:pic>
+        <p:nvPicPr>
+          <p:cNvPr id="1028" name="Picture 4" descr="https://images-na.ssl-images-amazon.com/images/I/511RiIYR7HL.jpg"/>
+          <p:cNvPicPr>
+            <a:picLocks noChangeAspect="1" noChangeArrowheads="1"/>
+          </p:cNvPicPr>
+          <p:nvPr/>
+        </p:nvPicPr>
+        <p:blipFill>
+          <a:blip r:embed="rId2">
+            <a:extLst>
+              <a:ext uri="{28A0092B-C50C-407E-A947-70E740481C1C}">
+                <a14:useLocalDpi xmlns:a14="http://schemas.microsoft.com/office/drawing/2010/main" val="0"/>
+              </a:ext>
+            </a:extLst>
+          </a:blip>
+          <a:srcRect/>
+          <a:stretch>
+            <a:fillRect/>
+          </a:stretch>
+        </p:blipFill>
+        <p:spPr bwMode="auto">
+          <a:xfrm>
+            <a:off x="2794591" y="1731391"/>
+            <a:ext cx="2672148" cy="3340185"/>
+          </a:xfrm>
+          <a:prstGeom prst="rect">
+            <a:avLst/>
+          </a:prstGeom>
+          <a:noFill/>
+          <a:ln>
+            <a:solidFill>
+              <a:schemeClr val="accent1"/>
+            </a:solidFill>
+          </a:ln>
+          <a:extLst>
+            <a:ext uri="{909E8E84-426E-40DD-AFC4-6F175D3DCCD1}">
+              <a14:hiddenFill xmlns:a14="http://schemas.microsoft.com/office/drawing/2010/main">
+                <a:solidFill>
+                  <a:srgbClr val="FFFFFF"/>
+                </a:solidFill>
+              </a14:hiddenFill>
+            </a:ext>
+          </a:extLst>
+        </p:spPr>
+      </p:pic>
+      <p:pic>
+        <p:nvPicPr>
+          <p:cNvPr id="2" name="Picture 1"/>
+          <p:cNvPicPr>
+            <a:picLocks noChangeAspect="1"/>
+          </p:cNvPicPr>
+          <p:nvPr/>
+        </p:nvPicPr>
+        <p:blipFill>
+          <a:blip r:embed="rId3"/>
+          <a:stretch>
+            <a:fillRect/>
+          </a:stretch>
+        </p:blipFill>
+        <p:spPr>
+          <a:xfrm>
+            <a:off x="5802187" y="1707748"/>
+            <a:ext cx="3108716" cy="3356830"/>
+          </a:xfrm>
+          <a:prstGeom prst="rect">
+            <a:avLst/>
+          </a:prstGeom>
+        </p:spPr>
+      </p:pic>
+      <p:pic>
+        <p:nvPicPr>
+          <p:cNvPr id="4098" name="Picture 2" descr="Image result for pcc sylvania sign"/>
+          <p:cNvPicPr>
+            <a:picLocks noChangeAspect="1" noChangeArrowheads="1"/>
+          </p:cNvPicPr>
+          <p:nvPr/>
+        </p:nvPicPr>
+        <p:blipFill rotWithShape="1">
+          <a:blip r:embed="rId4" cstate="print">
+            <a:extLst>
+              <a:ext uri="{28A0092B-C50C-407E-A947-70E740481C1C}">
+                <a14:useLocalDpi xmlns:a14="http://schemas.microsoft.com/office/drawing/2010/main" val="0"/>
+              </a:ext>
+            </a:extLst>
+          </a:blip>
+          <a:srcRect t="19296"/>
+          <a:stretch/>
+        </p:blipFill>
+        <p:spPr bwMode="auto">
+          <a:xfrm>
+            <a:off x="201268" y="2474891"/>
+            <a:ext cx="2421910" cy="1465930"/>
+          </a:xfrm>
+          <a:prstGeom prst="rect">
+            <a:avLst/>
+          </a:prstGeom>
+          <a:noFill/>
+          <a:extLst>
+            <a:ext uri="{909E8E84-426E-40DD-AFC4-6F175D3DCCD1}">
+              <a14:hiddenFill xmlns:a14="http://schemas.microsoft.com/office/drawing/2010/main">
+                <a:solidFill>
+                  <a:srgbClr val="FFFFFF"/>
+                </a:solidFill>
+              </a14:hiddenFill>
+            </a:ext>
+          </a:extLst>
+        </p:spPr>
+      </p:pic>
+      <p:sp>
+        <p:nvSpPr>
+          <p:cNvPr id="5" name="TextBox 4"/>
+          <p:cNvSpPr txBox="1"/>
+          <p:nvPr/>
+        </p:nvSpPr>
+        <p:spPr>
+          <a:xfrm>
+            <a:off x="401852" y="4064032"/>
+            <a:ext cx="2084673" cy="715581"/>
+          </a:xfrm>
+          <a:prstGeom prst="rect">
+            <a:avLst/>
+          </a:prstGeom>
+          <a:noFill/>
+        </p:spPr>
+        <p:txBody>
+          <a:bodyPr wrap="none" rtlCol="0">
+            <a:spAutoFit/>
+          </a:bodyPr>
+          <a:lstStyle/>
+          <a:p>
+            <a:pPr marL="214313" indent="-214313">
+              <a:buFont typeface="Arial" panose="020B0604020202020204" pitchFamily="34" charset="0"/>
+              <a:buChar char="•"/>
+            </a:pPr>
+            <a:r>
+              <a:rPr lang="en-US" sz="1350" dirty="0"/>
+              <a:t>Engineering Transfer</a:t>
+            </a:r>
+          </a:p>
+          <a:p>
+            <a:pPr marL="214313" indent="-214313">
+              <a:buFont typeface="Arial" panose="020B0604020202020204" pitchFamily="34" charset="0"/>
+              <a:buChar char="•"/>
+            </a:pPr>
+            <a:endParaRPr lang="en-US" sz="1350" dirty="0"/>
+          </a:p>
+          <a:p>
+            <a:pPr marL="214313" indent="-214313">
+              <a:buFont typeface="Arial" panose="020B0604020202020204" pitchFamily="34" charset="0"/>
+              <a:buChar char="•"/>
+            </a:pPr>
+            <a:r>
+              <a:rPr lang="en-US" sz="1350" dirty="0"/>
+              <a:t>2-year Engineering Tech</a:t>
+            </a:r>
+          </a:p>
+        </p:txBody>
+      </p:sp>
+      <p:sp>
+        <p:nvSpPr>
+          <p:cNvPr id="6" name="Rectangle 5"/>
+          <p:cNvSpPr/>
+          <p:nvPr/>
+        </p:nvSpPr>
+        <p:spPr>
+          <a:xfrm>
+            <a:off x="424270" y="5525354"/>
+            <a:ext cx="5718507" cy="1015663"/>
+          </a:xfrm>
+          <a:prstGeom prst="rect">
+            <a:avLst/>
+          </a:prstGeom>
+        </p:spPr>
+        <p:txBody>
+          <a:bodyPr wrap="square">
+            <a:spAutoFit/>
+          </a:bodyPr>
+          <a:lstStyle/>
+          <a:p>
+            <a:pPr>
+              <a:lnSpc>
+                <a:spcPct val="150000"/>
+              </a:lnSpc>
+            </a:pPr>
+            <a:r>
+              <a:rPr lang="en-US" sz="2400" dirty="0"/>
+              <a:t>GitHub: </a:t>
+            </a:r>
+            <a:r>
+              <a:rPr lang="en-US" sz="2400" dirty="0">
+                <a:hlinkClick r:id="rId5"/>
+              </a:rPr>
+              <a:t>github.com/</a:t>
+            </a:r>
+            <a:r>
+              <a:rPr lang="en-US" sz="2400" dirty="0" err="1">
+                <a:hlinkClick r:id="rId5"/>
+              </a:rPr>
+              <a:t>ProfessorKazarinoff</a:t>
+            </a:r>
+            <a:endParaRPr lang="en-US" sz="2400" dirty="0"/>
+          </a:p>
+          <a:p>
+            <a:r>
+              <a:rPr lang="en-US" sz="2400" dirty="0"/>
+              <a:t>Twitter: </a:t>
+            </a:r>
+            <a:r>
+              <a:rPr lang="en-US" sz="2400" dirty="0">
+                <a:hlinkClick r:id="rId6"/>
+              </a:rPr>
+              <a:t>@</a:t>
+            </a:r>
+            <a:r>
+              <a:rPr lang="en-US" sz="2400" dirty="0" err="1">
+                <a:hlinkClick r:id="rId6"/>
+              </a:rPr>
+              <a:t>pkazarinoff</a:t>
+            </a:r>
+            <a:endParaRPr lang="en-US" sz="2400" dirty="0"/>
+          </a:p>
+        </p:txBody>
+      </p:sp>
+      <p:sp>
+        <p:nvSpPr>
+          <p:cNvPr id="7" name="Rectangle 6"/>
+          <p:cNvSpPr/>
+          <p:nvPr/>
+        </p:nvSpPr>
+        <p:spPr>
+          <a:xfrm>
+            <a:off x="5858105" y="5064577"/>
+            <a:ext cx="3047116" cy="300082"/>
+          </a:xfrm>
+          <a:prstGeom prst="rect">
+            <a:avLst/>
+          </a:prstGeom>
+        </p:spPr>
+        <p:txBody>
+          <a:bodyPr wrap="none">
+            <a:spAutoFit/>
+          </a:bodyPr>
+          <a:lstStyle/>
+          <a:p>
+            <a:r>
+              <a:rPr lang="en-US" sz="1350" dirty="0"/>
+              <a:t>Blog: </a:t>
+            </a:r>
+            <a:r>
+              <a:rPr lang="en-US" sz="1350" dirty="0">
+                <a:hlinkClick r:id="rId7"/>
+              </a:rPr>
+              <a:t>pythonforundergradengineers.com</a:t>
+            </a:r>
+            <a:endParaRPr lang="en-US" sz="1350" dirty="0"/>
+          </a:p>
+        </p:txBody>
+      </p:sp>
+      <p:sp>
+        <p:nvSpPr>
+          <p:cNvPr id="8" name="Slide Number Placeholder 7"/>
+          <p:cNvSpPr>
+            <a:spLocks noGrp="1"/>
+          </p:cNvSpPr>
+          <p:nvPr>
+            <p:ph type="sldNum" sz="quarter" idx="12"/>
+          </p:nvPr>
+        </p:nvSpPr>
+        <p:spPr/>
+        <p:txBody>
+          <a:bodyPr/>
+          <a:lstStyle/>
+          <a:p>
+            <a:fld id="{5E1DF87B-6FA4-4912-8D72-E019C58E9B5A}" type="slidenum">
+              <a:rPr lang="en-US" smtClean="0"/>
+              <a:t>2</a:t>
+            </a:fld>
+            <a:endParaRPr lang="en-US"/>
+          </a:p>
+        </p:txBody>
+      </p:sp>
+      <p:sp>
+        <p:nvSpPr>
+          <p:cNvPr id="13" name="Title 1"/>
+          <p:cNvSpPr>
+            <a:spLocks noGrp="1"/>
+          </p:cNvSpPr>
+          <p:nvPr>
+            <p:ph type="title"/>
+          </p:nvPr>
+        </p:nvSpPr>
+        <p:spPr>
+          <a:xfrm>
+            <a:off x="201268" y="125584"/>
+            <a:ext cx="7886700" cy="1325563"/>
+          </a:xfrm>
+        </p:spPr>
+        <p:txBody>
+          <a:bodyPr/>
+          <a:lstStyle/>
+          <a:p>
+            <a:r>
+              <a:rPr lang="en-US" dirty="0" smtClean="0"/>
+              <a:t>Who </a:t>
+            </a:r>
+            <a:r>
+              <a:rPr lang="en-US" dirty="0" smtClean="0"/>
+              <a:t>is Peter?</a:t>
+            </a:r>
+            <a:endParaRPr lang="en-US" dirty="0"/>
+          </a:p>
+        </p:txBody>
+      </p:sp>
+    </p:spTree>
+    <p:extLst>
+      <p:ext uri="{BB962C8B-B14F-4D97-AF65-F5344CB8AC3E}">
+        <p14:creationId xmlns:p14="http://schemas.microsoft.com/office/powerpoint/2010/main" val="2640334448"/>
+      </p:ext>
+    </p:extLst>
+  </p:cSld>
+  <p:clrMapOvr>
+    <a:masterClrMapping/>
+  </p:clrMapOvr>
+  <p:timing>
+    <p:tnLst>
+      <p:par>
+        <p:cTn id="1" dur="indefinite" restart="never" nodeType="tmRoot"/>
+      </p:par>
+    </p:tnLst>
+  </p:timing>
+</p:sld>
+</file>
+
+<file path=ppt/slides/slide20.xml><?xml version="1.0" encoding="utf-8"?>
+<p:sld xmlns:a="http://schemas.openxmlformats.org/drawingml/2006/main" xmlns:r="http://schemas.openxmlformats.org/officeDocument/2006/relationships" xmlns:p="http://schemas.openxmlformats.org/presentationml/2006/main">
+  <p:cSld>
+    <p:spTree>
+      <p:nvGrpSpPr>
+        <p:cNvPr id="1" name=""/>
+        <p:cNvGrpSpPr/>
+        <p:nvPr/>
+      </p:nvGrpSpPr>
+      <p:grpSpPr>
+        <a:xfrm>
+          <a:off x="0" y="0"/>
+          <a:ext cx="0" cy="0"/>
+          <a:chOff x="0" y="0"/>
+          <a:chExt cx="0" cy="0"/>
+        </a:xfrm>
+      </p:grpSpPr>
+      <p:sp>
+        <p:nvSpPr>
+          <p:cNvPr id="2" name="Title 1"/>
+          <p:cNvSpPr>
+            <a:spLocks noGrp="1"/>
+          </p:cNvSpPr>
+          <p:nvPr>
+            <p:ph type="title"/>
+          </p:nvPr>
+        </p:nvSpPr>
         <p:spPr/>
         <p:txBody>
           <a:bodyPr/>
@@ -6210,7 +6830,7 @@
           <a:p>
             <a:fld id="{5E1DF87B-6FA4-4912-8D72-E019C58E9B5A}" type="slidenum">
               <a:rPr lang="en-US" smtClean="0"/>
-              <a:t>19</a:t>
+              <a:t>20</a:t>
             </a:fld>
             <a:endParaRPr lang="en-US"/>
           </a:p>
@@ -6519,353 +7139,6 @@
 </p:sld>
 </file>
 
-<file path=ppt/slides/slide2.xml><?xml version="1.0" encoding="utf-8"?>
-<p:sld xmlns:a="http://schemas.openxmlformats.org/drawingml/2006/main" xmlns:r="http://schemas.openxmlformats.org/officeDocument/2006/relationships" xmlns:p="http://schemas.openxmlformats.org/presentationml/2006/main">
-  <p:cSld>
-    <p:spTree>
-      <p:nvGrpSpPr>
-        <p:cNvPr id="1" name=""/>
-        <p:cNvGrpSpPr/>
-        <p:nvPr/>
-      </p:nvGrpSpPr>
-      <p:grpSpPr>
-        <a:xfrm>
-          <a:off x="0" y="0"/>
-          <a:ext cx="0" cy="0"/>
-          <a:chOff x="0" y="0"/>
-          <a:chExt cx="0" cy="0"/>
-        </a:xfrm>
-      </p:grpSpPr>
-      <p:pic>
-        <p:nvPicPr>
-          <p:cNvPr id="1028" name="Picture 4" descr="https://images-na.ssl-images-amazon.com/images/I/511RiIYR7HL.jpg"/>
-          <p:cNvPicPr>
-            <a:picLocks noChangeAspect="1" noChangeArrowheads="1"/>
-          </p:cNvPicPr>
-          <p:nvPr/>
-        </p:nvPicPr>
-        <p:blipFill>
-          <a:blip r:embed="rId2">
-            <a:extLst>
-              <a:ext uri="{28A0092B-C50C-407E-A947-70E740481C1C}">
-                <a14:useLocalDpi xmlns:a14="http://schemas.microsoft.com/office/drawing/2010/main" val="0"/>
-              </a:ext>
-            </a:extLst>
-          </a:blip>
-          <a:srcRect/>
-          <a:stretch>
-            <a:fillRect/>
-          </a:stretch>
-        </p:blipFill>
-        <p:spPr bwMode="auto">
-          <a:xfrm>
-            <a:off x="2794591" y="1731391"/>
-            <a:ext cx="2672148" cy="3340185"/>
-          </a:xfrm>
-          <a:prstGeom prst="rect">
-            <a:avLst/>
-          </a:prstGeom>
-          <a:noFill/>
-          <a:ln>
-            <a:solidFill>
-              <a:schemeClr val="accent1"/>
-            </a:solidFill>
-          </a:ln>
-          <a:extLst>
-            <a:ext uri="{909E8E84-426E-40DD-AFC4-6F175D3DCCD1}">
-              <a14:hiddenFill xmlns:a14="http://schemas.microsoft.com/office/drawing/2010/main">
-                <a:solidFill>
-                  <a:srgbClr val="FFFFFF"/>
-                </a:solidFill>
-              </a14:hiddenFill>
-            </a:ext>
-          </a:extLst>
-        </p:spPr>
-      </p:pic>
-      <p:pic>
-        <p:nvPicPr>
-          <p:cNvPr id="2" name="Picture 1"/>
-          <p:cNvPicPr>
-            <a:picLocks noChangeAspect="1"/>
-          </p:cNvPicPr>
-          <p:nvPr/>
-        </p:nvPicPr>
-        <p:blipFill>
-          <a:blip r:embed="rId3"/>
-          <a:stretch>
-            <a:fillRect/>
-          </a:stretch>
-        </p:blipFill>
-        <p:spPr>
-          <a:xfrm>
-            <a:off x="5802187" y="1707748"/>
-            <a:ext cx="3108716" cy="3356830"/>
-          </a:xfrm>
-          <a:prstGeom prst="rect">
-            <a:avLst/>
-          </a:prstGeom>
-        </p:spPr>
-      </p:pic>
-      <p:pic>
-        <p:nvPicPr>
-          <p:cNvPr id="4098" name="Picture 2" descr="Image result for pcc sylvania sign"/>
-          <p:cNvPicPr>
-            <a:picLocks noChangeAspect="1" noChangeArrowheads="1"/>
-          </p:cNvPicPr>
-          <p:nvPr/>
-        </p:nvPicPr>
-        <p:blipFill rotWithShape="1">
-          <a:blip r:embed="rId4" cstate="print">
-            <a:extLst>
-              <a:ext uri="{28A0092B-C50C-407E-A947-70E740481C1C}">
-                <a14:useLocalDpi xmlns:a14="http://schemas.microsoft.com/office/drawing/2010/main" val="0"/>
-              </a:ext>
-            </a:extLst>
-          </a:blip>
-          <a:srcRect t="19296"/>
-          <a:stretch/>
-        </p:blipFill>
-        <p:spPr bwMode="auto">
-          <a:xfrm>
-            <a:off x="201268" y="2474891"/>
-            <a:ext cx="2421910" cy="1465930"/>
-          </a:xfrm>
-          <a:prstGeom prst="rect">
-            <a:avLst/>
-          </a:prstGeom>
-          <a:noFill/>
-          <a:extLst>
-            <a:ext uri="{909E8E84-426E-40DD-AFC4-6F175D3DCCD1}">
-              <a14:hiddenFill xmlns:a14="http://schemas.microsoft.com/office/drawing/2010/main">
-                <a:solidFill>
-                  <a:srgbClr val="FFFFFF"/>
-                </a:solidFill>
-              </a14:hiddenFill>
-            </a:ext>
-          </a:extLst>
-        </p:spPr>
-      </p:pic>
-      <p:sp>
-        <p:nvSpPr>
-          <p:cNvPr id="5" name="TextBox 4"/>
-          <p:cNvSpPr txBox="1"/>
-          <p:nvPr/>
-        </p:nvSpPr>
-        <p:spPr>
-          <a:xfrm>
-            <a:off x="401852" y="4064032"/>
-            <a:ext cx="2084673" cy="715581"/>
-          </a:xfrm>
-          <a:prstGeom prst="rect">
-            <a:avLst/>
-          </a:prstGeom>
-          <a:noFill/>
-        </p:spPr>
-        <p:txBody>
-          <a:bodyPr wrap="none" rtlCol="0">
-            <a:spAutoFit/>
-          </a:bodyPr>
-          <a:lstStyle/>
-          <a:p>
-            <a:pPr marL="214313" indent="-214313">
-              <a:buFont typeface="Arial" panose="020B0604020202020204" pitchFamily="34" charset="0"/>
-              <a:buChar char="•"/>
-            </a:pPr>
-            <a:r>
-              <a:rPr lang="en-US" sz="1350" dirty="0"/>
-              <a:t>Engineering Transfer</a:t>
-            </a:r>
-          </a:p>
-          <a:p>
-            <a:pPr marL="214313" indent="-214313">
-              <a:buFont typeface="Arial" panose="020B0604020202020204" pitchFamily="34" charset="0"/>
-              <a:buChar char="•"/>
-            </a:pPr>
-            <a:endParaRPr lang="en-US" sz="1350" dirty="0"/>
-          </a:p>
-          <a:p>
-            <a:pPr marL="214313" indent="-214313">
-              <a:buFont typeface="Arial" panose="020B0604020202020204" pitchFamily="34" charset="0"/>
-              <a:buChar char="•"/>
-            </a:pPr>
-            <a:r>
-              <a:rPr lang="en-US" sz="1350" dirty="0"/>
-              <a:t>2-year Engineering Tech</a:t>
-            </a:r>
-          </a:p>
-        </p:txBody>
-      </p:sp>
-      <p:sp>
-        <p:nvSpPr>
-          <p:cNvPr id="6" name="Rectangle 5"/>
-          <p:cNvSpPr/>
-          <p:nvPr/>
-        </p:nvSpPr>
-        <p:spPr>
-          <a:xfrm>
-            <a:off x="424270" y="5525354"/>
-            <a:ext cx="5718507" cy="1015663"/>
-          </a:xfrm>
-          <a:prstGeom prst="rect">
-            <a:avLst/>
-          </a:prstGeom>
-        </p:spPr>
-        <p:txBody>
-          <a:bodyPr wrap="square">
-            <a:spAutoFit/>
-          </a:bodyPr>
-          <a:lstStyle/>
-          <a:p>
-            <a:pPr>
-              <a:lnSpc>
-                <a:spcPct val="150000"/>
-              </a:lnSpc>
-            </a:pPr>
-            <a:r>
-              <a:rPr lang="en-US" sz="2400" dirty="0"/>
-              <a:t>GitHub: </a:t>
-            </a:r>
-            <a:r>
-              <a:rPr lang="en-US" sz="2400" dirty="0">
-                <a:hlinkClick r:id="rId5"/>
-              </a:rPr>
-              <a:t>github.com/</a:t>
-            </a:r>
-            <a:r>
-              <a:rPr lang="en-US" sz="2400" dirty="0" err="1">
-                <a:hlinkClick r:id="rId5"/>
-              </a:rPr>
-              <a:t>ProfessorKazarinoff</a:t>
-            </a:r>
-            <a:endParaRPr lang="en-US" sz="2400" dirty="0"/>
-          </a:p>
-          <a:p>
-            <a:r>
-              <a:rPr lang="en-US" sz="2400" dirty="0"/>
-              <a:t>Twitter: </a:t>
-            </a:r>
-            <a:r>
-              <a:rPr lang="en-US" sz="2400" dirty="0">
-                <a:hlinkClick r:id="rId6"/>
-              </a:rPr>
-              <a:t>@</a:t>
-            </a:r>
-            <a:r>
-              <a:rPr lang="en-US" sz="2400" dirty="0" err="1">
-                <a:hlinkClick r:id="rId6"/>
-              </a:rPr>
-              <a:t>pkazarinoff</a:t>
-            </a:r>
-            <a:endParaRPr lang="en-US" sz="2400" dirty="0"/>
-          </a:p>
-        </p:txBody>
-      </p:sp>
-      <p:sp>
-        <p:nvSpPr>
-          <p:cNvPr id="7" name="Rectangle 6"/>
-          <p:cNvSpPr/>
-          <p:nvPr/>
-        </p:nvSpPr>
-        <p:spPr>
-          <a:xfrm>
-            <a:off x="5858105" y="5064577"/>
-            <a:ext cx="3047116" cy="300082"/>
-          </a:xfrm>
-          <a:prstGeom prst="rect">
-            <a:avLst/>
-          </a:prstGeom>
-        </p:spPr>
-        <p:txBody>
-          <a:bodyPr wrap="none">
-            <a:spAutoFit/>
-          </a:bodyPr>
-          <a:lstStyle/>
-          <a:p>
-            <a:r>
-              <a:rPr lang="en-US" sz="1350" dirty="0"/>
-              <a:t>Blog: </a:t>
-            </a:r>
-            <a:r>
-              <a:rPr lang="en-US" sz="1350" dirty="0">
-                <a:hlinkClick r:id="rId7"/>
-              </a:rPr>
-              <a:t>pythonforundergradengineers.com</a:t>
-            </a:r>
-            <a:endParaRPr lang="en-US" sz="1350" dirty="0"/>
-          </a:p>
-        </p:txBody>
-      </p:sp>
-      <p:sp>
-        <p:nvSpPr>
-          <p:cNvPr id="8" name="Slide Number Placeholder 7"/>
-          <p:cNvSpPr>
-            <a:spLocks noGrp="1"/>
-          </p:cNvSpPr>
-          <p:nvPr>
-            <p:ph type="sldNum" sz="quarter" idx="12"/>
-          </p:nvPr>
-        </p:nvSpPr>
-        <p:spPr/>
-        <p:txBody>
-          <a:bodyPr/>
-          <a:lstStyle/>
-          <a:p>
-            <a:fld id="{5E1DF87B-6FA4-4912-8D72-E019C58E9B5A}" type="slidenum">
-              <a:rPr lang="en-US" smtClean="0"/>
-              <a:t>2</a:t>
-            </a:fld>
-            <a:endParaRPr lang="en-US"/>
-          </a:p>
-        </p:txBody>
-      </p:sp>
-      <p:sp>
-        <p:nvSpPr>
-          <p:cNvPr id="13" name="Title 1"/>
-          <p:cNvSpPr>
-            <a:spLocks noGrp="1"/>
-          </p:cNvSpPr>
-          <p:nvPr>
-            <p:ph type="title"/>
-          </p:nvPr>
-        </p:nvSpPr>
-        <p:spPr>
-          <a:xfrm>
-            <a:off x="201268" y="125584"/>
-            <a:ext cx="7886700" cy="1325563"/>
-          </a:xfrm>
-        </p:spPr>
-        <p:txBody>
-          <a:bodyPr/>
-          <a:lstStyle/>
-          <a:p>
-            <a:r>
-              <a:rPr lang="en-US" dirty="0" smtClean="0"/>
-              <a:t>Who Am I?</a:t>
-            </a:r>
-            <a:endParaRPr lang="en-US" dirty="0"/>
-          </a:p>
-        </p:txBody>
-      </p:sp>
-    </p:spTree>
-    <p:extLst>
-      <p:ext uri="{BB962C8B-B14F-4D97-AF65-F5344CB8AC3E}">
-        <p14:creationId xmlns:p14="http://schemas.microsoft.com/office/powerpoint/2010/main" val="2640334448"/>
-      </p:ext>
-    </p:extLst>
-  </p:cSld>
-  <p:clrMapOvr>
-    <a:masterClrMapping/>
-  </p:clrMapOvr>
-  <p:timing>
-    <p:tnLst>
-      <p:par>
-        <p:cTn id="1" dur="indefinite" restart="never" nodeType="tmRoot"/>
-      </p:par>
-    </p:tnLst>
-  </p:timing>
-</p:sld>
-</file>
-
 <file path=ppt/slides/slide3.xml><?xml version="1.0" encoding="utf-8"?>
 <p:sld xmlns:a="http://schemas.openxmlformats.org/drawingml/2006/main" xmlns:r="http://schemas.openxmlformats.org/officeDocument/2006/relationships" xmlns:p="http://schemas.openxmlformats.org/presentationml/2006/main">
   <p:cSld>
@@ -7227,7 +7500,6 @@
               <a:rPr lang="en-US" sz="3200" dirty="0"/>
               <a:t>Could save students $25,000 in one year</a:t>
             </a:r>
-            <a:endParaRPr lang="en-US" sz="3200" dirty="0"/>
           </a:p>
         </p:txBody>
       </p:sp>

</xml_diff>